<commit_message>
Minor fix in Facade slides. Added adapter slides.
</commit_message>
<xml_diff>
--- a/slides/39 - Facade.pptx
+++ b/slides/39 - Facade.pptx
@@ -197,7 +197,7 @@
           <a:noFill/>
           <a:extLst>
             <a:ext uri="{909E8E84-426E-40dd-AFC4-6F175D3DCCD1}">
-              <a14:hiddenFill xmlns:a14="http://schemas.microsoft.com/office/drawing/2010/main" xmlns="">
+              <a14:hiddenFill xmlns="" xmlns:a14="http://schemas.microsoft.com/office/drawing/2010/main">
                 <a:solidFill>
                   <a:srgbClr val="FFFFFF"/>
                 </a:solidFill>
@@ -256,7 +256,7 @@
             </a:ln>
             <a:extLst>
               <a:ext uri="{91240B29-F687-4f45-9708-019B960494DF}">
-                <a14:hiddenLine xmlns:a14="http://schemas.microsoft.com/office/drawing/2010/main" xmlns="" w="9525">
+                <a14:hiddenLine xmlns="" xmlns:a14="http://schemas.microsoft.com/office/drawing/2010/main" w="9525">
                   <a:solidFill>
                     <a:srgbClr val="000000"/>
                   </a:solidFill>
@@ -346,7 +346,7 @@
             </a:ln>
             <a:extLst>
               <a:ext uri="{91240B29-F687-4f45-9708-019B960494DF}">
-                <a14:hiddenLine xmlns:a14="http://schemas.microsoft.com/office/drawing/2010/main" xmlns="" w="9525">
+                <a14:hiddenLine xmlns="" xmlns:a14="http://schemas.microsoft.com/office/drawing/2010/main" w="9525">
                   <a:solidFill>
                     <a:srgbClr val="000000"/>
                   </a:solidFill>
@@ -436,7 +436,7 @@
             </a:ln>
             <a:extLst>
               <a:ext uri="{91240B29-F687-4f45-9708-019B960494DF}">
-                <a14:hiddenLine xmlns:a14="http://schemas.microsoft.com/office/drawing/2010/main" xmlns="" w="9525">
+                <a14:hiddenLine xmlns="" xmlns:a14="http://schemas.microsoft.com/office/drawing/2010/main" w="9525">
                   <a:solidFill>
                     <a:srgbClr val="000000"/>
                   </a:solidFill>
@@ -470,7 +470,7 @@
             </a:ln>
             <a:extLst>
               <a:ext uri="{91240B29-F687-4f45-9708-019B960494DF}">
-                <a14:hiddenLine xmlns:a14="http://schemas.microsoft.com/office/drawing/2010/main" xmlns="" w="9525">
+                <a14:hiddenLine xmlns="" xmlns:a14="http://schemas.microsoft.com/office/drawing/2010/main" w="9525">
                   <a:solidFill>
                     <a:srgbClr val="000000"/>
                   </a:solidFill>
@@ -560,7 +560,7 @@
             </a:ln>
             <a:extLst>
               <a:ext uri="{91240B29-F687-4f45-9708-019B960494DF}">
-                <a14:hiddenLine xmlns:a14="http://schemas.microsoft.com/office/drawing/2010/main" xmlns="" w="9525">
+                <a14:hiddenLine xmlns="" xmlns:a14="http://schemas.microsoft.com/office/drawing/2010/main" w="9525">
                   <a:solidFill>
                     <a:srgbClr val="000000"/>
                   </a:solidFill>
@@ -622,7 +622,7 @@
             </a:ln>
             <a:extLst>
               <a:ext uri="{91240B29-F687-4f45-9708-019B960494DF}">
-                <a14:hiddenLine xmlns:a14="http://schemas.microsoft.com/office/drawing/2010/main" xmlns="" w="9525">
+                <a14:hiddenLine xmlns="" xmlns:a14="http://schemas.microsoft.com/office/drawing/2010/main" w="9525">
                   <a:solidFill>
                     <a:srgbClr val="000000"/>
                   </a:solidFill>
@@ -684,7 +684,7 @@
             </a:ln>
             <a:extLst>
               <a:ext uri="{91240B29-F687-4f45-9708-019B960494DF}">
-                <a14:hiddenLine xmlns:a14="http://schemas.microsoft.com/office/drawing/2010/main" xmlns="" w="9525">
+                <a14:hiddenLine xmlns="" xmlns:a14="http://schemas.microsoft.com/office/drawing/2010/main" w="9525">
                   <a:solidFill>
                     <a:srgbClr val="000000"/>
                   </a:solidFill>
@@ -774,7 +774,7 @@
             </a:ln>
             <a:extLst>
               <a:ext uri="{91240B29-F687-4f45-9708-019B960494DF}">
-                <a14:hiddenLine xmlns:a14="http://schemas.microsoft.com/office/drawing/2010/main" xmlns="" w="9525">
+                <a14:hiddenLine xmlns="" xmlns:a14="http://schemas.microsoft.com/office/drawing/2010/main" w="9525">
                   <a:solidFill>
                     <a:srgbClr val="000000"/>
                   </a:solidFill>
@@ -836,7 +836,7 @@
             </a:ln>
             <a:extLst>
               <a:ext uri="{91240B29-F687-4f45-9708-019B960494DF}">
-                <a14:hiddenLine xmlns:a14="http://schemas.microsoft.com/office/drawing/2010/main" xmlns="" w="9525">
+                <a14:hiddenLine xmlns="" xmlns:a14="http://schemas.microsoft.com/office/drawing/2010/main" w="9525">
                   <a:solidFill>
                     <a:srgbClr val="000000"/>
                   </a:solidFill>
@@ -898,7 +898,7 @@
             </a:ln>
             <a:extLst>
               <a:ext uri="{91240B29-F687-4f45-9708-019B960494DF}">
-                <a14:hiddenLine xmlns:a14="http://schemas.microsoft.com/office/drawing/2010/main" xmlns="" w="9525">
+                <a14:hiddenLine xmlns="" xmlns:a14="http://schemas.microsoft.com/office/drawing/2010/main" w="9525">
                   <a:solidFill>
                     <a:srgbClr val="000000"/>
                   </a:solidFill>
@@ -988,7 +988,7 @@
             </a:ln>
             <a:extLst>
               <a:ext uri="{91240B29-F687-4f45-9708-019B960494DF}">
-                <a14:hiddenLine xmlns:a14="http://schemas.microsoft.com/office/drawing/2010/main" xmlns="" w="9525">
+                <a14:hiddenLine xmlns="" xmlns:a14="http://schemas.microsoft.com/office/drawing/2010/main" w="9525">
                   <a:solidFill>
                     <a:srgbClr val="000000"/>
                   </a:solidFill>
@@ -1078,7 +1078,7 @@
             </a:ln>
             <a:extLst>
               <a:ext uri="{91240B29-F687-4f45-9708-019B960494DF}">
-                <a14:hiddenLine xmlns:a14="http://schemas.microsoft.com/office/drawing/2010/main" xmlns="" w="9525">
+                <a14:hiddenLine xmlns="" xmlns:a14="http://schemas.microsoft.com/office/drawing/2010/main" w="9525">
                   <a:solidFill>
                     <a:srgbClr val="000000"/>
                   </a:solidFill>
@@ -1140,7 +1140,7 @@
             </a:ln>
             <a:extLst>
               <a:ext uri="{91240B29-F687-4f45-9708-019B960494DF}">
-                <a14:hiddenLine xmlns:a14="http://schemas.microsoft.com/office/drawing/2010/main" xmlns="" w="9525">
+                <a14:hiddenLine xmlns="" xmlns:a14="http://schemas.microsoft.com/office/drawing/2010/main" w="9525">
                   <a:solidFill>
                     <a:srgbClr val="000000"/>
                   </a:solidFill>
@@ -1250,7 +1250,7 @@
             </a:ln>
             <a:extLst>
               <a:ext uri="{91240B29-F687-4f45-9708-019B960494DF}">
-                <a14:hiddenLine xmlns:a14="http://schemas.microsoft.com/office/drawing/2010/main" xmlns="" w="9525">
+                <a14:hiddenLine xmlns="" xmlns:a14="http://schemas.microsoft.com/office/drawing/2010/main" w="9525">
                   <a:solidFill>
                     <a:srgbClr val="000000"/>
                   </a:solidFill>
@@ -1312,7 +1312,7 @@
             </a:ln>
             <a:extLst>
               <a:ext uri="{91240B29-F687-4f45-9708-019B960494DF}">
-                <a14:hiddenLine xmlns:a14="http://schemas.microsoft.com/office/drawing/2010/main" xmlns="" w="9525">
+                <a14:hiddenLine xmlns="" xmlns:a14="http://schemas.microsoft.com/office/drawing/2010/main" w="9525">
                   <a:solidFill>
                     <a:srgbClr val="000000"/>
                   </a:solidFill>
@@ -1402,7 +1402,7 @@
             </a:ln>
             <a:extLst>
               <a:ext uri="{91240B29-F687-4f45-9708-019B960494DF}">
-                <a14:hiddenLine xmlns:a14="http://schemas.microsoft.com/office/drawing/2010/main" xmlns="" w="9525">
+                <a14:hiddenLine xmlns="" xmlns:a14="http://schemas.microsoft.com/office/drawing/2010/main" w="9525">
                   <a:solidFill>
                     <a:srgbClr val="000000"/>
                   </a:solidFill>
@@ -1492,7 +1492,7 @@
             </a:ln>
             <a:extLst>
               <a:ext uri="{91240B29-F687-4f45-9708-019B960494DF}">
-                <a14:hiddenLine xmlns:a14="http://schemas.microsoft.com/office/drawing/2010/main" xmlns="" w="9525">
+                <a14:hiddenLine xmlns="" xmlns:a14="http://schemas.microsoft.com/office/drawing/2010/main" w="9525">
                   <a:solidFill>
                     <a:srgbClr val="000000"/>
                   </a:solidFill>
@@ -1554,7 +1554,7 @@
             </a:ln>
             <a:extLst>
               <a:ext uri="{91240B29-F687-4f45-9708-019B960494DF}">
-                <a14:hiddenLine xmlns:a14="http://schemas.microsoft.com/office/drawing/2010/main" xmlns="" w="9525">
+                <a14:hiddenLine xmlns="" xmlns:a14="http://schemas.microsoft.com/office/drawing/2010/main" w="9525">
                   <a:solidFill>
                     <a:srgbClr val="000000"/>
                   </a:solidFill>
@@ -1644,7 +1644,7 @@
             </a:ln>
             <a:extLst>
               <a:ext uri="{91240B29-F687-4f45-9708-019B960494DF}">
-                <a14:hiddenLine xmlns:a14="http://schemas.microsoft.com/office/drawing/2010/main" xmlns="" w="9525">
+                <a14:hiddenLine xmlns="" xmlns:a14="http://schemas.microsoft.com/office/drawing/2010/main" w="9525">
                   <a:solidFill>
                     <a:srgbClr val="000000"/>
                   </a:solidFill>
@@ -1734,7 +1734,7 @@
             </a:ln>
             <a:extLst>
               <a:ext uri="{91240B29-F687-4f45-9708-019B960494DF}">
-                <a14:hiddenLine xmlns:a14="http://schemas.microsoft.com/office/drawing/2010/main" xmlns="" w="9525">
+                <a14:hiddenLine xmlns="" xmlns:a14="http://schemas.microsoft.com/office/drawing/2010/main" w="9525">
                   <a:solidFill>
                     <a:srgbClr val="000000"/>
                   </a:solidFill>
@@ -1790,7 +1790,7 @@
             </a:ln>
             <a:extLst>
               <a:ext uri="{91240B29-F687-4f45-9708-019B960494DF}">
-                <a14:hiddenLine xmlns:a14="http://schemas.microsoft.com/office/drawing/2010/main" xmlns="" w="9525">
+                <a14:hiddenLine xmlns="" xmlns:a14="http://schemas.microsoft.com/office/drawing/2010/main" w="9525">
                   <a:solidFill>
                     <a:srgbClr val="000000"/>
                   </a:solidFill>
@@ -1880,7 +1880,7 @@
             </a:ln>
             <a:extLst>
               <a:ext uri="{91240B29-F687-4f45-9708-019B960494DF}">
-                <a14:hiddenLine xmlns:a14="http://schemas.microsoft.com/office/drawing/2010/main" xmlns="" w="9525">
+                <a14:hiddenLine xmlns="" xmlns:a14="http://schemas.microsoft.com/office/drawing/2010/main" w="9525">
                   <a:solidFill>
                     <a:srgbClr val="000000"/>
                   </a:solidFill>
@@ -1936,7 +1936,7 @@
             </a:ln>
             <a:extLst>
               <a:ext uri="{91240B29-F687-4f45-9708-019B960494DF}">
-                <a14:hiddenLine xmlns:a14="http://schemas.microsoft.com/office/drawing/2010/main" xmlns="" w="9525">
+                <a14:hiddenLine xmlns="" xmlns:a14="http://schemas.microsoft.com/office/drawing/2010/main" w="9525">
                   <a:solidFill>
                     <a:srgbClr val="000000"/>
                   </a:solidFill>
@@ -2026,7 +2026,7 @@
             </a:ln>
             <a:extLst>
               <a:ext uri="{91240B29-F687-4f45-9708-019B960494DF}">
-                <a14:hiddenLine xmlns:a14="http://schemas.microsoft.com/office/drawing/2010/main" xmlns="" w="9525">
+                <a14:hiddenLine xmlns="" xmlns:a14="http://schemas.microsoft.com/office/drawing/2010/main" w="9525">
                   <a:solidFill>
                     <a:srgbClr val="000000"/>
                   </a:solidFill>
@@ -2094,7 +2094,7 @@
             </a:ln>
             <a:extLst>
               <a:ext uri="{91240B29-F687-4f45-9708-019B960494DF}">
-                <a14:hiddenLine xmlns:a14="http://schemas.microsoft.com/office/drawing/2010/main" xmlns="" w="9525">
+                <a14:hiddenLine xmlns="" xmlns:a14="http://schemas.microsoft.com/office/drawing/2010/main" w="9525">
                   <a:solidFill>
                     <a:srgbClr val="000000"/>
                   </a:solidFill>
@@ -2184,7 +2184,7 @@
             </a:ln>
             <a:extLst>
               <a:ext uri="{91240B29-F687-4f45-9708-019B960494DF}">
-                <a14:hiddenLine xmlns:a14="http://schemas.microsoft.com/office/drawing/2010/main" xmlns="" w="9525">
+                <a14:hiddenLine xmlns="" xmlns:a14="http://schemas.microsoft.com/office/drawing/2010/main" w="9525">
                   <a:solidFill>
                     <a:srgbClr val="000000"/>
                   </a:solidFill>
@@ -2252,7 +2252,7 @@
             </a:ln>
             <a:extLst>
               <a:ext uri="{91240B29-F687-4f45-9708-019B960494DF}">
-                <a14:hiddenLine xmlns:a14="http://schemas.microsoft.com/office/drawing/2010/main" xmlns="" w="9525">
+                <a14:hiddenLine xmlns="" xmlns:a14="http://schemas.microsoft.com/office/drawing/2010/main" w="9525">
                   <a:solidFill>
                     <a:srgbClr val="000000"/>
                   </a:solidFill>
@@ -2342,7 +2342,7 @@
             </a:ln>
             <a:extLst>
               <a:ext uri="{91240B29-F687-4f45-9708-019B960494DF}">
-                <a14:hiddenLine xmlns:a14="http://schemas.microsoft.com/office/drawing/2010/main" xmlns="" w="9525">
+                <a14:hiddenLine xmlns="" xmlns:a14="http://schemas.microsoft.com/office/drawing/2010/main" w="9525">
                   <a:solidFill>
                     <a:srgbClr val="000000"/>
                   </a:solidFill>
@@ -2376,7 +2376,7 @@
             </a:ln>
             <a:extLst>
               <a:ext uri="{91240B29-F687-4f45-9708-019B960494DF}">
-                <a14:hiddenLine xmlns:a14="http://schemas.microsoft.com/office/drawing/2010/main" xmlns="" w="9525">
+                <a14:hiddenLine xmlns="" xmlns:a14="http://schemas.microsoft.com/office/drawing/2010/main" w="9525">
                   <a:solidFill>
                     <a:srgbClr val="000000"/>
                   </a:solidFill>
@@ -2466,7 +2466,7 @@
             </a:ln>
             <a:extLst>
               <a:ext uri="{91240B29-F687-4f45-9708-019B960494DF}">
-                <a14:hiddenLine xmlns:a14="http://schemas.microsoft.com/office/drawing/2010/main" xmlns="" w="9525">
+                <a14:hiddenLine xmlns="" xmlns:a14="http://schemas.microsoft.com/office/drawing/2010/main" w="9525">
                   <a:solidFill>
                     <a:srgbClr val="000000"/>
                   </a:solidFill>
@@ -2528,7 +2528,7 @@
             </a:ln>
             <a:extLst>
               <a:ext uri="{91240B29-F687-4f45-9708-019B960494DF}">
-                <a14:hiddenLine xmlns:a14="http://schemas.microsoft.com/office/drawing/2010/main" xmlns="" w="9525">
+                <a14:hiddenLine xmlns="" xmlns:a14="http://schemas.microsoft.com/office/drawing/2010/main" w="9525">
                   <a:solidFill>
                     <a:srgbClr val="000000"/>
                   </a:solidFill>
@@ -2590,7 +2590,7 @@
             </a:ln>
             <a:extLst>
               <a:ext uri="{91240B29-F687-4f45-9708-019B960494DF}">
-                <a14:hiddenLine xmlns:a14="http://schemas.microsoft.com/office/drawing/2010/main" xmlns="" w="9525">
+                <a14:hiddenLine xmlns="" xmlns:a14="http://schemas.microsoft.com/office/drawing/2010/main" w="9525">
                   <a:solidFill>
                     <a:srgbClr val="000000"/>
                   </a:solidFill>
@@ -2680,7 +2680,7 @@
             </a:ln>
             <a:extLst>
               <a:ext uri="{91240B29-F687-4f45-9708-019B960494DF}">
-                <a14:hiddenLine xmlns:a14="http://schemas.microsoft.com/office/drawing/2010/main" xmlns="" w="9525">
+                <a14:hiddenLine xmlns="" xmlns:a14="http://schemas.microsoft.com/office/drawing/2010/main" w="9525">
                   <a:solidFill>
                     <a:srgbClr val="000000"/>
                   </a:solidFill>
@@ -2748,7 +2748,7 @@
             </a:ln>
             <a:extLst>
               <a:ext uri="{91240B29-F687-4f45-9708-019B960494DF}">
-                <a14:hiddenLine xmlns:a14="http://schemas.microsoft.com/office/drawing/2010/main" xmlns="" w="9525">
+                <a14:hiddenLine xmlns="" xmlns:a14="http://schemas.microsoft.com/office/drawing/2010/main" w="9525">
                   <a:solidFill>
                     <a:srgbClr val="000000"/>
                   </a:solidFill>
@@ -2810,7 +2810,7 @@
             </a:ln>
             <a:extLst>
               <a:ext uri="{91240B29-F687-4f45-9708-019B960494DF}">
-                <a14:hiddenLine xmlns:a14="http://schemas.microsoft.com/office/drawing/2010/main" xmlns="" w="9525">
+                <a14:hiddenLine xmlns="" xmlns:a14="http://schemas.microsoft.com/office/drawing/2010/main" w="9525">
                   <a:solidFill>
                     <a:srgbClr val="000000"/>
                   </a:solidFill>
@@ -2900,7 +2900,7 @@
             </a:ln>
             <a:extLst>
               <a:ext uri="{91240B29-F687-4f45-9708-019B960494DF}">
-                <a14:hiddenLine xmlns:a14="http://schemas.microsoft.com/office/drawing/2010/main" xmlns="" w="9525">
+                <a14:hiddenLine xmlns="" xmlns:a14="http://schemas.microsoft.com/office/drawing/2010/main" w="9525">
                   <a:solidFill>
                     <a:srgbClr val="000000"/>
                   </a:solidFill>
@@ -2962,7 +2962,7 @@
             </a:ln>
             <a:extLst>
               <a:ext uri="{91240B29-F687-4f45-9708-019B960494DF}">
-                <a14:hiddenLine xmlns:a14="http://schemas.microsoft.com/office/drawing/2010/main" xmlns="" w="9525">
+                <a14:hiddenLine xmlns="" xmlns:a14="http://schemas.microsoft.com/office/drawing/2010/main" w="9525">
                   <a:solidFill>
                     <a:srgbClr val="000000"/>
                   </a:solidFill>
@@ -3052,7 +3052,7 @@
             </a:ln>
             <a:extLst>
               <a:ext uri="{91240B29-F687-4f45-9708-019B960494DF}">
-                <a14:hiddenLine xmlns:a14="http://schemas.microsoft.com/office/drawing/2010/main" xmlns="" w="9525">
+                <a14:hiddenLine xmlns="" xmlns:a14="http://schemas.microsoft.com/office/drawing/2010/main" w="9525">
                   <a:solidFill>
                     <a:srgbClr val="000000"/>
                   </a:solidFill>
@@ -3114,7 +3114,7 @@
             </a:ln>
             <a:extLst>
               <a:ext uri="{91240B29-F687-4f45-9708-019B960494DF}">
-                <a14:hiddenLine xmlns:a14="http://schemas.microsoft.com/office/drawing/2010/main" xmlns="" w="9525">
+                <a14:hiddenLine xmlns="" xmlns:a14="http://schemas.microsoft.com/office/drawing/2010/main" w="9525">
                   <a:solidFill>
                     <a:srgbClr val="000000"/>
                   </a:solidFill>
@@ -3204,7 +3204,7 @@
             </a:ln>
             <a:extLst>
               <a:ext uri="{91240B29-F687-4f45-9708-019B960494DF}">
-                <a14:hiddenLine xmlns:a14="http://schemas.microsoft.com/office/drawing/2010/main" xmlns="" w="9525">
+                <a14:hiddenLine xmlns="" xmlns:a14="http://schemas.microsoft.com/office/drawing/2010/main" w="9525">
                   <a:solidFill>
                     <a:srgbClr val="000000"/>
                   </a:solidFill>
@@ -3238,7 +3238,7 @@
             </a:ln>
             <a:extLst>
               <a:ext uri="{91240B29-F687-4f45-9708-019B960494DF}">
-                <a14:hiddenLine xmlns:a14="http://schemas.microsoft.com/office/drawing/2010/main" xmlns="" w="9525">
+                <a14:hiddenLine xmlns="" xmlns:a14="http://schemas.microsoft.com/office/drawing/2010/main" w="9525">
                   <a:solidFill>
                     <a:srgbClr val="000000"/>
                   </a:solidFill>
@@ -3303,7 +3303,7 @@
             </a:ln>
             <a:extLst>
               <a:ext uri="{91240B29-F687-4f45-9708-019B960494DF}">
-                <a14:hiddenLine xmlns:a14="http://schemas.microsoft.com/office/drawing/2010/main" xmlns="" w="9525">
+                <a14:hiddenLine xmlns="" xmlns:a14="http://schemas.microsoft.com/office/drawing/2010/main" w="9525">
                   <a:solidFill>
                     <a:srgbClr val="000000"/>
                   </a:solidFill>
@@ -3393,7 +3393,7 @@
             </a:ln>
             <a:extLst>
               <a:ext uri="{91240B29-F687-4f45-9708-019B960494DF}">
-                <a14:hiddenLine xmlns:a14="http://schemas.microsoft.com/office/drawing/2010/main" xmlns="" w="9525">
+                <a14:hiddenLine xmlns="" xmlns:a14="http://schemas.microsoft.com/office/drawing/2010/main" w="9525">
                   <a:solidFill>
                     <a:srgbClr val="000000"/>
                   </a:solidFill>
@@ -3455,7 +3455,7 @@
             </a:ln>
             <a:extLst>
               <a:ext uri="{91240B29-F687-4f45-9708-019B960494DF}">
-                <a14:hiddenLine xmlns:a14="http://schemas.microsoft.com/office/drawing/2010/main" xmlns="" w="9525">
+                <a14:hiddenLine xmlns="" xmlns:a14="http://schemas.microsoft.com/office/drawing/2010/main" w="9525">
                   <a:solidFill>
                     <a:srgbClr val="000000"/>
                   </a:solidFill>
@@ -3545,7 +3545,7 @@
             </a:ln>
             <a:extLst>
               <a:ext uri="{91240B29-F687-4f45-9708-019B960494DF}">
-                <a14:hiddenLine xmlns:a14="http://schemas.microsoft.com/office/drawing/2010/main" xmlns="" w="9525">
+                <a14:hiddenLine xmlns="" xmlns:a14="http://schemas.microsoft.com/office/drawing/2010/main" w="9525">
                   <a:solidFill>
                     <a:srgbClr val="000000"/>
                   </a:solidFill>
@@ -3635,7 +3635,7 @@
             </a:ln>
             <a:extLst>
               <a:ext uri="{91240B29-F687-4f45-9708-019B960494DF}">
-                <a14:hiddenLine xmlns:a14="http://schemas.microsoft.com/office/drawing/2010/main" xmlns="" w="9525">
+                <a14:hiddenLine xmlns="" xmlns:a14="http://schemas.microsoft.com/office/drawing/2010/main" w="9525">
                   <a:solidFill>
                     <a:srgbClr val="000000"/>
                   </a:solidFill>
@@ -3700,7 +3700,7 @@
             </a:ln>
             <a:extLst>
               <a:ext uri="{91240B29-F687-4f45-9708-019B960494DF}">
-                <a14:hiddenLine xmlns:a14="http://schemas.microsoft.com/office/drawing/2010/main" xmlns="" w="9525">
+                <a14:hiddenLine xmlns="" xmlns:a14="http://schemas.microsoft.com/office/drawing/2010/main" w="9525">
                   <a:solidFill>
                     <a:srgbClr val="000000"/>
                   </a:solidFill>
@@ -3762,7 +3762,7 @@
             </a:ln>
             <a:extLst>
               <a:ext uri="{91240B29-F687-4f45-9708-019B960494DF}">
-                <a14:hiddenLine xmlns:a14="http://schemas.microsoft.com/office/drawing/2010/main" xmlns="" w="9525">
+                <a14:hiddenLine xmlns="" xmlns:a14="http://schemas.microsoft.com/office/drawing/2010/main" w="9525">
                   <a:solidFill>
                     <a:srgbClr val="000000"/>
                   </a:solidFill>
@@ -3852,7 +3852,7 @@
             </a:ln>
             <a:extLst>
               <a:ext uri="{91240B29-F687-4f45-9708-019B960494DF}">
-                <a14:hiddenLine xmlns:a14="http://schemas.microsoft.com/office/drawing/2010/main" xmlns="" w="9525">
+                <a14:hiddenLine xmlns="" xmlns:a14="http://schemas.microsoft.com/office/drawing/2010/main" w="9525">
                   <a:solidFill>
                     <a:srgbClr val="000000"/>
                   </a:solidFill>
@@ -3942,7 +3942,7 @@
             </a:ln>
             <a:extLst>
               <a:ext uri="{91240B29-F687-4f45-9708-019B960494DF}">
-                <a14:hiddenLine xmlns:a14="http://schemas.microsoft.com/office/drawing/2010/main" xmlns="" w="9525">
+                <a14:hiddenLine xmlns="" xmlns:a14="http://schemas.microsoft.com/office/drawing/2010/main" w="9525">
                   <a:solidFill>
                     <a:srgbClr val="000000"/>
                   </a:solidFill>
@@ -4004,7 +4004,7 @@
             </a:ln>
             <a:extLst>
               <a:ext uri="{91240B29-F687-4f45-9708-019B960494DF}">
-                <a14:hiddenLine xmlns:a14="http://schemas.microsoft.com/office/drawing/2010/main" xmlns="" w="9525">
+                <a14:hiddenLine xmlns="" xmlns:a14="http://schemas.microsoft.com/office/drawing/2010/main" w="9525">
                   <a:solidFill>
                     <a:srgbClr val="000000"/>
                   </a:solidFill>
@@ -4124,7 +4124,7 @@
             </a:ln>
             <a:extLst>
               <a:ext uri="{91240B29-F687-4f45-9708-019B960494DF}">
-                <a14:hiddenLine xmlns:a14="http://schemas.microsoft.com/office/drawing/2010/main" xmlns="" w="9525">
+                <a14:hiddenLine xmlns="" xmlns:a14="http://schemas.microsoft.com/office/drawing/2010/main" w="9525">
                   <a:solidFill>
                     <a:srgbClr val="000000"/>
                   </a:solidFill>
@@ -4192,7 +4192,7 @@
             </a:ln>
             <a:extLst>
               <a:ext uri="{91240B29-F687-4f45-9708-019B960494DF}">
-                <a14:hiddenLine xmlns:a14="http://schemas.microsoft.com/office/drawing/2010/main" xmlns="" w="9525">
+                <a14:hiddenLine xmlns="" xmlns:a14="http://schemas.microsoft.com/office/drawing/2010/main" w="9525">
                   <a:solidFill>
                     <a:srgbClr val="000000"/>
                   </a:solidFill>
@@ -4282,7 +4282,7 @@
             </a:ln>
             <a:extLst>
               <a:ext uri="{91240B29-F687-4f45-9708-019B960494DF}">
-                <a14:hiddenLine xmlns:a14="http://schemas.microsoft.com/office/drawing/2010/main" xmlns="" w="9525">
+                <a14:hiddenLine xmlns="" xmlns:a14="http://schemas.microsoft.com/office/drawing/2010/main" w="9525">
                   <a:solidFill>
                     <a:srgbClr val="000000"/>
                   </a:solidFill>
@@ -9156,7 +9156,7 @@
           <a:noFill/>
           <a:extLst>
             <a:ext uri="{909E8E84-426E-40dd-AFC4-6F175D3DCCD1}">
-              <a14:hiddenFill xmlns:a14="http://schemas.microsoft.com/office/drawing/2010/main" xmlns="">
+              <a14:hiddenFill xmlns="" xmlns:a14="http://schemas.microsoft.com/office/drawing/2010/main">
                 <a:solidFill>
                   <a:srgbClr val="FFFFFF"/>
                 </a:solidFill>
@@ -9230,7 +9230,7 @@
               </a:ln>
               <a:extLst>
                 <a:ext uri="{91240B29-F687-4f45-9708-019B960494DF}">
-                  <a14:hiddenLine xmlns:a14="http://schemas.microsoft.com/office/drawing/2010/main" xmlns="" w="9525">
+                  <a14:hiddenLine xmlns="" xmlns:a14="http://schemas.microsoft.com/office/drawing/2010/main" w="9525">
                     <a:solidFill>
                       <a:srgbClr val="000000"/>
                     </a:solidFill>
@@ -9320,7 +9320,7 @@
               </a:ln>
               <a:extLst>
                 <a:ext uri="{91240B29-F687-4f45-9708-019B960494DF}">
-                  <a14:hiddenLine xmlns:a14="http://schemas.microsoft.com/office/drawing/2010/main" xmlns="" w="9525">
+                  <a14:hiddenLine xmlns="" xmlns:a14="http://schemas.microsoft.com/office/drawing/2010/main" w="9525">
                     <a:solidFill>
                       <a:srgbClr val="000000"/>
                     </a:solidFill>
@@ -9410,7 +9410,7 @@
               </a:ln>
               <a:extLst>
                 <a:ext uri="{91240B29-F687-4f45-9708-019B960494DF}">
-                  <a14:hiddenLine xmlns:a14="http://schemas.microsoft.com/office/drawing/2010/main" xmlns="" w="9525">
+                  <a14:hiddenLine xmlns="" xmlns:a14="http://schemas.microsoft.com/office/drawing/2010/main" w="9525">
                     <a:solidFill>
                       <a:srgbClr val="000000"/>
                     </a:solidFill>
@@ -9472,7 +9472,7 @@
               </a:ln>
               <a:extLst>
                 <a:ext uri="{91240B29-F687-4f45-9708-019B960494DF}">
-                  <a14:hiddenLine xmlns:a14="http://schemas.microsoft.com/office/drawing/2010/main" xmlns="" w="9525">
+                  <a14:hiddenLine xmlns="" xmlns:a14="http://schemas.microsoft.com/office/drawing/2010/main" w="9525">
                     <a:solidFill>
                       <a:srgbClr val="000000"/>
                     </a:solidFill>
@@ -9562,7 +9562,7 @@
               </a:ln>
               <a:extLst>
                 <a:ext uri="{91240B29-F687-4f45-9708-019B960494DF}">
-                  <a14:hiddenLine xmlns:a14="http://schemas.microsoft.com/office/drawing/2010/main" xmlns="" w="9525">
+                  <a14:hiddenLine xmlns="" xmlns:a14="http://schemas.microsoft.com/office/drawing/2010/main" w="9525">
                     <a:solidFill>
                       <a:srgbClr val="000000"/>
                     </a:solidFill>
@@ -9624,7 +9624,7 @@
               </a:ln>
               <a:extLst>
                 <a:ext uri="{91240B29-F687-4f45-9708-019B960494DF}">
-                  <a14:hiddenLine xmlns:a14="http://schemas.microsoft.com/office/drawing/2010/main" xmlns="" w="9525">
+                  <a14:hiddenLine xmlns="" xmlns:a14="http://schemas.microsoft.com/office/drawing/2010/main" w="9525">
                     <a:solidFill>
                       <a:srgbClr val="000000"/>
                     </a:solidFill>
@@ -9686,7 +9686,7 @@
               </a:ln>
               <a:extLst>
                 <a:ext uri="{91240B29-F687-4f45-9708-019B960494DF}">
-                  <a14:hiddenLine xmlns:a14="http://schemas.microsoft.com/office/drawing/2010/main" xmlns="" w="9525">
+                  <a14:hiddenLine xmlns="" xmlns:a14="http://schemas.microsoft.com/office/drawing/2010/main" w="9525">
                     <a:solidFill>
                       <a:srgbClr val="000000"/>
                     </a:solidFill>
@@ -9776,7 +9776,7 @@
               </a:ln>
               <a:extLst>
                 <a:ext uri="{91240B29-F687-4f45-9708-019B960494DF}">
-                  <a14:hiddenLine xmlns:a14="http://schemas.microsoft.com/office/drawing/2010/main" xmlns="" w="9525">
+                  <a14:hiddenLine xmlns="" xmlns:a14="http://schemas.microsoft.com/office/drawing/2010/main" w="9525">
                     <a:solidFill>
                       <a:srgbClr val="000000"/>
                     </a:solidFill>
@@ -9866,7 +9866,7 @@
               </a:ln>
               <a:extLst>
                 <a:ext uri="{91240B29-F687-4f45-9708-019B960494DF}">
-                  <a14:hiddenLine xmlns:a14="http://schemas.microsoft.com/office/drawing/2010/main" xmlns="" w="9525">
+                  <a14:hiddenLine xmlns="" xmlns:a14="http://schemas.microsoft.com/office/drawing/2010/main" w="9525">
                     <a:solidFill>
                       <a:srgbClr val="000000"/>
                     </a:solidFill>
@@ -9928,7 +9928,7 @@
               </a:ln>
               <a:extLst>
                 <a:ext uri="{91240B29-F687-4f45-9708-019B960494DF}">
-                  <a14:hiddenLine xmlns:a14="http://schemas.microsoft.com/office/drawing/2010/main" xmlns="" w="9525">
+                  <a14:hiddenLine xmlns="" xmlns:a14="http://schemas.microsoft.com/office/drawing/2010/main" w="9525">
                     <a:solidFill>
                       <a:srgbClr val="000000"/>
                     </a:solidFill>
@@ -10038,7 +10038,7 @@
               </a:ln>
               <a:extLst>
                 <a:ext uri="{91240B29-F687-4f45-9708-019B960494DF}">
-                  <a14:hiddenLine xmlns:a14="http://schemas.microsoft.com/office/drawing/2010/main" xmlns="" w="9525">
+                  <a14:hiddenLine xmlns="" xmlns:a14="http://schemas.microsoft.com/office/drawing/2010/main" w="9525">
                     <a:solidFill>
                       <a:srgbClr val="000000"/>
                     </a:solidFill>
@@ -10122,7 +10122,7 @@
               </a:ln>
               <a:extLst>
                 <a:ext uri="{91240B29-F687-4f45-9708-019B960494DF}">
-                  <a14:hiddenLine xmlns:a14="http://schemas.microsoft.com/office/drawing/2010/main" xmlns="" w="9525">
+                  <a14:hiddenLine xmlns="" xmlns:a14="http://schemas.microsoft.com/office/drawing/2010/main" w="9525">
                     <a:solidFill>
                       <a:srgbClr val="000000"/>
                     </a:solidFill>
@@ -10184,7 +10184,7 @@
               </a:ln>
               <a:extLst>
                 <a:ext uri="{91240B29-F687-4f45-9708-019B960494DF}">
-                  <a14:hiddenLine xmlns:a14="http://schemas.microsoft.com/office/drawing/2010/main" xmlns="" w="9525">
+                  <a14:hiddenLine xmlns="" xmlns:a14="http://schemas.microsoft.com/office/drawing/2010/main" w="9525">
                     <a:solidFill>
                       <a:srgbClr val="000000"/>
                     </a:solidFill>
@@ -10246,7 +10246,7 @@
               </a:ln>
               <a:extLst>
                 <a:ext uri="{91240B29-F687-4f45-9708-019B960494DF}">
-                  <a14:hiddenLine xmlns:a14="http://schemas.microsoft.com/office/drawing/2010/main" xmlns="" w="9525">
+                  <a14:hiddenLine xmlns="" xmlns:a14="http://schemas.microsoft.com/office/drawing/2010/main" w="9525">
                     <a:solidFill>
                       <a:srgbClr val="000000"/>
                     </a:solidFill>
@@ -10336,7 +10336,7 @@
               </a:ln>
               <a:extLst>
                 <a:ext uri="{91240B29-F687-4f45-9708-019B960494DF}">
-                  <a14:hiddenLine xmlns:a14="http://schemas.microsoft.com/office/drawing/2010/main" xmlns="" w="9525">
+                  <a14:hiddenLine xmlns="" xmlns:a14="http://schemas.microsoft.com/office/drawing/2010/main" w="9525">
                     <a:solidFill>
                       <a:srgbClr val="000000"/>
                     </a:solidFill>
@@ -10370,7 +10370,7 @@
               </a:ln>
               <a:extLst>
                 <a:ext uri="{91240B29-F687-4f45-9708-019B960494DF}">
-                  <a14:hiddenLine xmlns:a14="http://schemas.microsoft.com/office/drawing/2010/main" xmlns="" w="9525">
+                  <a14:hiddenLine xmlns="" xmlns:a14="http://schemas.microsoft.com/office/drawing/2010/main" w="9525">
                     <a:solidFill>
                       <a:srgbClr val="000000"/>
                     </a:solidFill>
@@ -10435,7 +10435,7 @@
               </a:ln>
               <a:extLst>
                 <a:ext uri="{91240B29-F687-4f45-9708-019B960494DF}">
-                  <a14:hiddenLine xmlns:a14="http://schemas.microsoft.com/office/drawing/2010/main" xmlns="" w="9525">
+                  <a14:hiddenLine xmlns="" xmlns:a14="http://schemas.microsoft.com/office/drawing/2010/main" w="9525">
                     <a:solidFill>
                       <a:srgbClr val="000000"/>
                     </a:solidFill>
@@ -10525,7 +10525,7 @@
               </a:ln>
               <a:extLst>
                 <a:ext uri="{91240B29-F687-4f45-9708-019B960494DF}">
-                  <a14:hiddenLine xmlns:a14="http://schemas.microsoft.com/office/drawing/2010/main" xmlns="" w="9525">
+                  <a14:hiddenLine xmlns="" xmlns:a14="http://schemas.microsoft.com/office/drawing/2010/main" w="9525">
                     <a:solidFill>
                       <a:srgbClr val="000000"/>
                     </a:solidFill>
@@ -10587,7 +10587,7 @@
               </a:ln>
               <a:extLst>
                 <a:ext uri="{91240B29-F687-4f45-9708-019B960494DF}">
-                  <a14:hiddenLine xmlns:a14="http://schemas.microsoft.com/office/drawing/2010/main" xmlns="" w="9525">
+                  <a14:hiddenLine xmlns="" xmlns:a14="http://schemas.microsoft.com/office/drawing/2010/main" w="9525">
                     <a:solidFill>
                       <a:srgbClr val="000000"/>
                     </a:solidFill>
@@ -10677,7 +10677,7 @@
               </a:ln>
               <a:extLst>
                 <a:ext uri="{91240B29-F687-4f45-9708-019B960494DF}">
-                  <a14:hiddenLine xmlns:a14="http://schemas.microsoft.com/office/drawing/2010/main" xmlns="" w="9525">
+                  <a14:hiddenLine xmlns="" xmlns:a14="http://schemas.microsoft.com/office/drawing/2010/main" w="9525">
                     <a:solidFill>
                       <a:srgbClr val="000000"/>
                     </a:solidFill>
@@ -10742,7 +10742,7 @@
               </a:ln>
               <a:extLst>
                 <a:ext uri="{91240B29-F687-4f45-9708-019B960494DF}">
-                  <a14:hiddenLine xmlns:a14="http://schemas.microsoft.com/office/drawing/2010/main" xmlns="" w="9525">
+                  <a14:hiddenLine xmlns="" xmlns:a14="http://schemas.microsoft.com/office/drawing/2010/main" w="9525">
                     <a:solidFill>
                       <a:srgbClr val="000000"/>
                     </a:solidFill>
@@ -10804,7 +10804,7 @@
               </a:ln>
               <a:extLst>
                 <a:ext uri="{91240B29-F687-4f45-9708-019B960494DF}">
-                  <a14:hiddenLine xmlns:a14="http://schemas.microsoft.com/office/drawing/2010/main" xmlns="" w="9525">
+                  <a14:hiddenLine xmlns="" xmlns:a14="http://schemas.microsoft.com/office/drawing/2010/main" w="9525">
                     <a:solidFill>
                       <a:srgbClr val="000000"/>
                     </a:solidFill>
@@ -10894,7 +10894,7 @@
               </a:ln>
               <a:extLst>
                 <a:ext uri="{91240B29-F687-4f45-9708-019B960494DF}">
-                  <a14:hiddenLine xmlns:a14="http://schemas.microsoft.com/office/drawing/2010/main" xmlns="" w="9525">
+                  <a14:hiddenLine xmlns="" xmlns:a14="http://schemas.microsoft.com/office/drawing/2010/main" w="9525">
                     <a:solidFill>
                       <a:srgbClr val="000000"/>
                     </a:solidFill>
@@ -10984,7 +10984,7 @@
               </a:ln>
               <a:extLst>
                 <a:ext uri="{91240B29-F687-4f45-9708-019B960494DF}">
-                  <a14:hiddenLine xmlns:a14="http://schemas.microsoft.com/office/drawing/2010/main" xmlns="" w="9525">
+                  <a14:hiddenLine xmlns="" xmlns:a14="http://schemas.microsoft.com/office/drawing/2010/main" w="9525">
                     <a:solidFill>
                       <a:srgbClr val="000000"/>
                     </a:solidFill>
@@ -11049,7 +11049,7 @@
               </a:ln>
               <a:extLst>
                 <a:ext uri="{91240B29-F687-4f45-9708-019B960494DF}">
-                  <a14:hiddenLine xmlns:a14="http://schemas.microsoft.com/office/drawing/2010/main" xmlns="" w="9525">
+                  <a14:hiddenLine xmlns="" xmlns:a14="http://schemas.microsoft.com/office/drawing/2010/main" w="9525">
                     <a:solidFill>
                       <a:srgbClr val="000000"/>
                     </a:solidFill>
@@ -11169,7 +11169,7 @@
               </a:ln>
               <a:extLst>
                 <a:ext uri="{91240B29-F687-4f45-9708-019B960494DF}">
-                  <a14:hiddenLine xmlns:a14="http://schemas.microsoft.com/office/drawing/2010/main" xmlns="" w="9525">
+                  <a14:hiddenLine xmlns="" xmlns:a14="http://schemas.microsoft.com/office/drawing/2010/main" w="9525">
                     <a:solidFill>
                       <a:srgbClr val="000000"/>
                     </a:solidFill>
@@ -11250,7 +11250,7 @@
               </a:ln>
               <a:extLst>
                 <a:ext uri="{91240B29-F687-4f45-9708-019B960494DF}">
-                  <a14:hiddenLine xmlns:a14="http://schemas.microsoft.com/office/drawing/2010/main" xmlns="" w="9525">
+                  <a14:hiddenLine xmlns="" xmlns:a14="http://schemas.microsoft.com/office/drawing/2010/main" w="9525">
                     <a:solidFill>
                       <a:srgbClr val="000000"/>
                     </a:solidFill>
@@ -11365,7 +11365,7 @@
               </a:ln>
               <a:extLst>
                 <a:ext uri="{91240B29-F687-4f45-9708-019B960494DF}">
-                  <a14:hiddenLine xmlns:a14="http://schemas.microsoft.com/office/drawing/2010/main" xmlns="" w="9525">
+                  <a14:hiddenLine xmlns="" xmlns:a14="http://schemas.microsoft.com/office/drawing/2010/main" w="9525">
                     <a:solidFill>
                       <a:srgbClr val="000000"/>
                     </a:solidFill>
@@ -11455,7 +11455,7 @@
               </a:ln>
               <a:extLst>
                 <a:ext uri="{91240B29-F687-4f45-9708-019B960494DF}">
-                  <a14:hiddenLine xmlns:a14="http://schemas.microsoft.com/office/drawing/2010/main" xmlns="" w="9525">
+                  <a14:hiddenLine xmlns="" xmlns:a14="http://schemas.microsoft.com/office/drawing/2010/main" w="9525">
                     <a:solidFill>
                       <a:srgbClr val="000000"/>
                     </a:solidFill>
@@ -11520,7 +11520,7 @@
               </a:ln>
               <a:extLst>
                 <a:ext uri="{91240B29-F687-4f45-9708-019B960494DF}">
-                  <a14:hiddenLine xmlns:a14="http://schemas.microsoft.com/office/drawing/2010/main" xmlns="" w="9525">
+                  <a14:hiddenLine xmlns="" xmlns:a14="http://schemas.microsoft.com/office/drawing/2010/main" w="9525">
                     <a:solidFill>
                       <a:srgbClr val="000000"/>
                     </a:solidFill>
@@ -11610,7 +11610,7 @@
               </a:ln>
               <a:extLst>
                 <a:ext uri="{91240B29-F687-4f45-9708-019B960494DF}">
-                  <a14:hiddenLine xmlns:a14="http://schemas.microsoft.com/office/drawing/2010/main" xmlns="" w="9525">
+                  <a14:hiddenLine xmlns="" xmlns:a14="http://schemas.microsoft.com/office/drawing/2010/main" w="9525">
                     <a:solidFill>
                       <a:srgbClr val="000000"/>
                     </a:solidFill>
@@ -11678,7 +11678,7 @@
               </a:ln>
               <a:extLst>
                 <a:ext uri="{91240B29-F687-4f45-9708-019B960494DF}">
-                  <a14:hiddenLine xmlns:a14="http://schemas.microsoft.com/office/drawing/2010/main" xmlns="" w="9525">
+                  <a14:hiddenLine xmlns="" xmlns:a14="http://schemas.microsoft.com/office/drawing/2010/main" w="9525">
                     <a:solidFill>
                       <a:srgbClr val="000000"/>
                     </a:solidFill>
@@ -11768,7 +11768,7 @@
               </a:ln>
               <a:extLst>
                 <a:ext uri="{91240B29-F687-4f45-9708-019B960494DF}">
-                  <a14:hiddenLine xmlns:a14="http://schemas.microsoft.com/office/drawing/2010/main" xmlns="" w="9525">
+                  <a14:hiddenLine xmlns="" xmlns:a14="http://schemas.microsoft.com/office/drawing/2010/main" w="9525">
                     <a:solidFill>
                       <a:srgbClr val="000000"/>
                     </a:solidFill>
@@ -11836,7 +11836,7 @@
               </a:ln>
               <a:extLst>
                 <a:ext uri="{91240B29-F687-4f45-9708-019B960494DF}">
-                  <a14:hiddenLine xmlns:a14="http://schemas.microsoft.com/office/drawing/2010/main" xmlns="" w="9525">
+                  <a14:hiddenLine xmlns="" xmlns:a14="http://schemas.microsoft.com/office/drawing/2010/main" w="9525">
                     <a:solidFill>
                       <a:srgbClr val="000000"/>
                     </a:solidFill>
@@ -11926,7 +11926,7 @@
               </a:ln>
               <a:extLst>
                 <a:ext uri="{91240B29-F687-4f45-9708-019B960494DF}">
-                  <a14:hiddenLine xmlns:a14="http://schemas.microsoft.com/office/drawing/2010/main" xmlns="" w="9525">
+                  <a14:hiddenLine xmlns="" xmlns:a14="http://schemas.microsoft.com/office/drawing/2010/main" w="9525">
                     <a:solidFill>
                       <a:srgbClr val="000000"/>
                     </a:solidFill>
@@ -11960,7 +11960,7 @@
               </a:ln>
               <a:extLst>
                 <a:ext uri="{91240B29-F687-4f45-9708-019B960494DF}">
-                  <a14:hiddenLine xmlns:a14="http://schemas.microsoft.com/office/drawing/2010/main" xmlns="" w="9525">
+                  <a14:hiddenLine xmlns="" xmlns:a14="http://schemas.microsoft.com/office/drawing/2010/main" w="9525">
                     <a:solidFill>
                       <a:srgbClr val="000000"/>
                     </a:solidFill>
@@ -13669,7 +13669,15 @@
           <a:p>
             <a:r>
               <a:rPr lang="en-US" dirty="0"/>
-              <a:t>Design Patterns Explained: chapters 3{8.</a:t>
+              <a:t>Design Patterns Explained: </a:t>
+            </a:r>
+            <a:r>
+              <a:rPr lang="en-US"/>
+              <a:t>chapters 3-8</a:t>
+            </a:r>
+            <a:r>
+              <a:rPr lang="en-US" dirty="0"/>
+              <a:t>.</a:t>
             </a:r>
           </a:p>
           <a:p>

</xml_diff>